<commit_message>
correction of the Lambda_inv slide -- JA Salomon
</commit_message>
<xml_diff>
--- a/master_files/materials/02_Theory.pptx
+++ b/master_files/materials/02_Theory.pptx
@@ -153,10 +153,10 @@
 <file path=ppt/revisionInfo.xml><?xml version="1.0" encoding="utf-8"?>
 <p1510:revInfo xmlns:a="http://schemas.openxmlformats.org/drawingml/2006/main" xmlns:r="http://schemas.openxmlformats.org/officeDocument/2006/relationships" xmlns:p1510="http://schemas.microsoft.com/office/powerpoint/2015/10/main">
   <p1510:revLst>
+    <p1510:client id="{EF2D0F1B-141F-5943-3652-63BD3E557E8F}" v="112" dt="2024-10-24T12:02:55.926"/>
+    <p1510:client id="{B75E930D-5E45-1C43-B22A-EB7A887D4510}" v="826" dt="2024-10-24T17:46:57.136"/>
+    <p1510:client id="{3386F1E1-383E-54AC-6936-A35E2C84F8C8}" v="124" dt="2024-10-24T11:56:16.523"/>
     <p1510:client id="{1C754E17-F4C1-DA44-68A0-12F0D9E02299}" v="163" dt="2024-10-24T12:00:46.280"/>
-    <p1510:client id="{3386F1E1-383E-54AC-6936-A35E2C84F8C8}" v="124" dt="2024-10-24T11:56:16.523"/>
-    <p1510:client id="{B75E930D-5E45-1C43-B22A-EB7A887D4510}" v="826" dt="2024-10-24T17:46:57.136"/>
-    <p1510:client id="{EF2D0F1B-141F-5943-3652-63BD3E557E8F}" v="112" dt="2024-10-24T12:02:55.926"/>
   </p1510:revLst>
 </p1510:revInfo>
 </file>
@@ -243,7 +243,7 @@
           <a:p>
             <a:fld id="{E033252C-ECEF-0044-BF19-FBFB46CE84A2}" type="datetimeFigureOut">
               <a:rPr lang="en-US" smtClean="0"/>
-              <a:t>10/26/24</a:t>
+              <a:t>10/31/24</a:t>
             </a:fld>
             <a:endParaRPr lang="en-US"/>
           </a:p>
@@ -766,7 +766,7 @@
           <a:p>
             <a:fld id="{6A8FB48A-BFC4-2846-8228-6201ABA4D0C5}" type="datetimeFigureOut">
               <a:rPr lang="en-US" smtClean="0"/>
-              <a:t>10/26/24</a:t>
+              <a:t>10/31/24</a:t>
             </a:fld>
             <a:endParaRPr lang="en-US"/>
           </a:p>
@@ -964,7 +964,7 @@
           <a:p>
             <a:fld id="{6A8FB48A-BFC4-2846-8228-6201ABA4D0C5}" type="datetimeFigureOut">
               <a:rPr lang="en-US" smtClean="0"/>
-              <a:t>10/26/24</a:t>
+              <a:t>10/31/24</a:t>
             </a:fld>
             <a:endParaRPr lang="en-US"/>
           </a:p>
@@ -1172,7 +1172,7 @@
           <a:p>
             <a:fld id="{6A8FB48A-BFC4-2846-8228-6201ABA4D0C5}" type="datetimeFigureOut">
               <a:rPr lang="en-US" smtClean="0"/>
-              <a:t>10/26/24</a:t>
+              <a:t>10/31/24</a:t>
             </a:fld>
             <a:endParaRPr lang="en-US"/>
           </a:p>
@@ -1370,7 +1370,7 @@
           <a:p>
             <a:fld id="{6A8FB48A-BFC4-2846-8228-6201ABA4D0C5}" type="datetimeFigureOut">
               <a:rPr lang="en-US" smtClean="0"/>
-              <a:t>10/26/24</a:t>
+              <a:t>10/31/24</a:t>
             </a:fld>
             <a:endParaRPr lang="en-US"/>
           </a:p>
@@ -1645,7 +1645,7 @@
           <a:p>
             <a:fld id="{6A8FB48A-BFC4-2846-8228-6201ABA4D0C5}" type="datetimeFigureOut">
               <a:rPr lang="en-US" smtClean="0"/>
-              <a:t>10/26/24</a:t>
+              <a:t>10/31/24</a:t>
             </a:fld>
             <a:endParaRPr lang="en-US"/>
           </a:p>
@@ -1910,7 +1910,7 @@
           <a:p>
             <a:fld id="{6A8FB48A-BFC4-2846-8228-6201ABA4D0C5}" type="datetimeFigureOut">
               <a:rPr lang="en-US" smtClean="0"/>
-              <a:t>10/26/24</a:t>
+              <a:t>10/31/24</a:t>
             </a:fld>
             <a:endParaRPr lang="en-US"/>
           </a:p>
@@ -2322,7 +2322,7 @@
           <a:p>
             <a:fld id="{6A8FB48A-BFC4-2846-8228-6201ABA4D0C5}" type="datetimeFigureOut">
               <a:rPr lang="en-US" smtClean="0"/>
-              <a:t>10/26/24</a:t>
+              <a:t>10/31/24</a:t>
             </a:fld>
             <a:endParaRPr lang="en-US"/>
           </a:p>
@@ -2463,7 +2463,7 @@
           <a:p>
             <a:fld id="{6A8FB48A-BFC4-2846-8228-6201ABA4D0C5}" type="datetimeFigureOut">
               <a:rPr lang="en-US" smtClean="0"/>
-              <a:t>10/26/24</a:t>
+              <a:t>10/31/24</a:t>
             </a:fld>
             <a:endParaRPr lang="en-US"/>
           </a:p>
@@ -2576,7 +2576,7 @@
           <a:p>
             <a:fld id="{6A8FB48A-BFC4-2846-8228-6201ABA4D0C5}" type="datetimeFigureOut">
               <a:rPr lang="en-US" smtClean="0"/>
-              <a:t>10/26/24</a:t>
+              <a:t>10/31/24</a:t>
             </a:fld>
             <a:endParaRPr lang="en-US"/>
           </a:p>
@@ -2887,7 +2887,7 @@
           <a:p>
             <a:fld id="{6A8FB48A-BFC4-2846-8228-6201ABA4D0C5}" type="datetimeFigureOut">
               <a:rPr lang="en-US" smtClean="0"/>
-              <a:t>10/26/24</a:t>
+              <a:t>10/31/24</a:t>
             </a:fld>
             <a:endParaRPr lang="en-US"/>
           </a:p>
@@ -3175,7 +3175,7 @@
           <a:p>
             <a:fld id="{6A8FB48A-BFC4-2846-8228-6201ABA4D0C5}" type="datetimeFigureOut">
               <a:rPr lang="en-US" smtClean="0"/>
-              <a:t>10/26/24</a:t>
+              <a:t>10/31/24</a:t>
             </a:fld>
             <a:endParaRPr lang="en-US"/>
           </a:p>
@@ -3416,7 +3416,7 @@
           <a:p>
             <a:fld id="{6A8FB48A-BFC4-2846-8228-6201ABA4D0C5}" type="datetimeFigureOut">
               <a:rPr lang="en-US" smtClean="0"/>
-              <a:t>10/26/24</a:t>
+              <a:t>10/31/24</a:t>
             </a:fld>
             <a:endParaRPr lang="en-US"/>
           </a:p>
@@ -3857,7 +3857,7 @@
         </p:nvGraphicFramePr>
         <p:xfrm>
           <a:off x="1208690" y="942340"/>
-          <a:ext cx="10720551" cy="4973320"/>
+          <a:ext cx="10720551" cy="4699000"/>
         </p:xfrm>
         <a:graphic>
           <a:graphicData uri="http://schemas.openxmlformats.org/drawingml/2006/table">
@@ -11971,8 +11971,8 @@
           </p:sp>
         </mc:Fallback>
       </mc:AlternateContent>
-      <mc:AlternateContent xmlns:mc="http://schemas.openxmlformats.org/markup-compatibility/2006" xmlns:a14="http://schemas.microsoft.com/office/drawing/2010/main">
-        <mc:Choice Requires="a14">
+      <mc:AlternateContent xmlns:mc="http://schemas.openxmlformats.org/markup-compatibility/2006">
+        <mc:Choice xmlns:a14="http://schemas.microsoft.com/office/drawing/2010/main" Requires="a14">
           <p:sp>
             <p:nvSpPr>
               <p:cNvPr id="8" name="Content Placeholder 7">
@@ -11992,7 +11992,7 @@
             <p:spPr/>
             <p:txBody>
               <a:bodyPr>
-                <a:normAutofit fontScale="92500" lnSpcReduction="10000"/>
+                <a:normAutofit fontScale="92500"/>
               </a:bodyPr>
               <a:lstStyle/>
               <a:p>
@@ -12069,7 +12069,7 @@
             </p:txBody>
           </p:sp>
         </mc:Choice>
-        <mc:Fallback xmlns="">
+        <mc:Fallback>
           <p:sp>
             <p:nvSpPr>
               <p:cNvPr id="8" name="Content Placeholder 7">
@@ -12090,7 +12090,7 @@
               <a:blipFill>
                 <a:blip r:embed="rId3"/>
                 <a:stretch>
-                  <a:fillRect l="-2200" t="-2616"/>
+                  <a:fillRect l="-1956" t="-2339" r="-2200"/>
                 </a:stretch>
               </a:blipFill>
             </p:spPr>
@@ -16971,10 +16971,10 @@
       </p:grpSpPr>
       <p:pic>
         <p:nvPicPr>
-          <p:cNvPr id="13" name="Content Placeholder 12">
+          <p:cNvPr id="5" name="Content Placeholder 4">
             <a:extLst>
               <a:ext uri="{FF2B5EF4-FFF2-40B4-BE49-F238E27FC236}">
-                <a16:creationId xmlns:a16="http://schemas.microsoft.com/office/drawing/2014/main" id="{955322BB-9839-EFC4-954B-75FB78F225C6}"/>
+                <a16:creationId xmlns:a16="http://schemas.microsoft.com/office/drawing/2014/main" id="{F1252057-FDA8-024D-8094-EE3D521CF6D4}"/>
               </a:ext>
             </a:extLst>
           </p:cNvPr>
@@ -17286,8 +17286,8 @@
           </a:xfrm>
         </p:spPr>
       </p:pic>
-      <mc:AlternateContent xmlns:mc="http://schemas.openxmlformats.org/markup-compatibility/2006" xmlns:a14="http://schemas.microsoft.com/office/drawing/2010/main">
-        <mc:Choice Requires="a14">
+      <mc:AlternateContent xmlns:mc="http://schemas.openxmlformats.org/markup-compatibility/2006">
+        <mc:Choice xmlns:a14="http://schemas.microsoft.com/office/drawing/2010/main" Requires="a14">
           <p:sp>
             <p:nvSpPr>
               <p:cNvPr id="16" name="TextBox 15">
@@ -17303,7 +17303,7 @@
             <p:spPr>
               <a:xfrm>
                 <a:off x="7144082" y="2969591"/>
-                <a:ext cx="2937407" cy="710194"/>
+                <a:ext cx="1785297" cy="369332"/>
               </a:xfrm>
               <a:prstGeom prst="rect">
                 <a:avLst/>
@@ -17351,11 +17351,28 @@
                           </m:r>
                         </m:sup>
                       </m:sSup>
+                      <m:d>
+                        <m:dPr>
+                          <m:ctrlPr>
+                            <a:rPr lang="en-US" b="0" i="1" smtClean="0">
+                              <a:latin typeface="Cambria Math" panose="02040503050406030204" pitchFamily="18" charset="0"/>
+                            </a:rPr>
+                          </m:ctrlPr>
+                        </m:dPr>
+                        <m:e>
+                          <m:r>
+                            <a:rPr lang="en-US" b="0" i="1" smtClean="0">
+                              <a:latin typeface="Cambria Math" panose="02040503050406030204" pitchFamily="18" charset="0"/>
+                            </a:rPr>
+                            <m:t>𝑧</m:t>
+                          </m:r>
+                        </m:e>
+                      </m:d>
                       <m:r>
                         <a:rPr lang="en-US" b="0" i="1" smtClean="0">
                           <a:latin typeface="Cambria Math" panose="02040503050406030204" pitchFamily="18" charset="0"/>
                         </a:rPr>
-                        <m:t>(</m:t>
+                        <m:t>=</m:t>
                       </m:r>
                       <m:r>
                         <a:rPr lang="en-US" b="0" i="1" smtClean="0">
@@ -17367,103 +17384,8 @@
                         <a:rPr lang="en-US" b="0" i="1" smtClean="0">
                           <a:latin typeface="Cambria Math" panose="02040503050406030204" pitchFamily="18" charset="0"/>
                         </a:rPr>
-                        <m:t>)=</m:t>
+                        <m:t>+1</m:t>
                       </m:r>
-                      <m:d>
-                        <m:dPr>
-                          <m:begChr m:val="{"/>
-                          <m:endChr m:val=""/>
-                          <m:ctrlPr>
-                            <a:rPr lang="en-US" b="0" i="1" smtClean="0">
-                              <a:latin typeface="Cambria Math" panose="02040503050406030204" pitchFamily="18" charset="0"/>
-                            </a:rPr>
-                          </m:ctrlPr>
-                        </m:dPr>
-                        <m:e>
-                          <m:eqArr>
-                            <m:eqArrPr>
-                              <m:ctrlPr>
-                                <a:rPr lang="en-US" b="0" i="1" smtClean="0">
-                                  <a:latin typeface="Cambria Math" panose="02040503050406030204" pitchFamily="18" charset="0"/>
-                                </a:rPr>
-                              </m:ctrlPr>
-                            </m:eqArrPr>
-                            <m:e>
-                              <m:r>
-                                <m:rPr>
-                                  <m:sty m:val="p"/>
-                                </m:rPr>
-                                <a:rPr lang="en-US" b="0" i="0" smtClean="0">
-                                  <a:latin typeface="Cambria Math" panose="02040503050406030204" pitchFamily="18" charset="0"/>
-                                </a:rPr>
-                                <m:t>u</m:t>
-                              </m:r>
-                              <m:r>
-                                <m:rPr>
-                                  <m:sty m:val="p"/>
-                                </m:rPr>
-                                <a:rPr lang="en-US">
-                                  <a:latin typeface="Cambria Math" panose="02040503050406030204" pitchFamily="18" charset="0"/>
-                                </a:rPr>
-                                <m:t>ndefined</m:t>
-                              </m:r>
-                              <m:r>
-                                <a:rPr lang="en-US" i="1">
-                                  <a:latin typeface="Cambria Math" panose="02040503050406030204" pitchFamily="18" charset="0"/>
-                                </a:rPr>
-                                <m:t>, </m:t>
-                              </m:r>
-                              <m:r>
-                                <m:rPr>
-                                  <m:sty m:val="p"/>
-                                </m:rPr>
-                                <a:rPr lang="en-US">
-                                  <a:latin typeface="Cambria Math" panose="02040503050406030204" pitchFamily="18" charset="0"/>
-                                </a:rPr>
-                                <m:t>z</m:t>
-                              </m:r>
-                              <m:r>
-                                <a:rPr lang="en-US">
-                                  <a:latin typeface="Cambria Math" panose="02040503050406030204" pitchFamily="18" charset="0"/>
-                                </a:rPr>
-                                <m:t>&lt;1</m:t>
-                              </m:r>
-                            </m:e>
-                            <m:e>
-                              <m:r>
-                                <a:rPr lang="en-US" b="0" i="1" smtClean="0">
-                                  <a:latin typeface="Cambria Math" panose="02040503050406030204" pitchFamily="18" charset="0"/>
-                                </a:rPr>
-                                <m:t>&amp;</m:t>
-                              </m:r>
-                              <m:r>
-                                <a:rPr lang="en-US" i="1">
-                                  <a:latin typeface="Cambria Math" panose="02040503050406030204" pitchFamily="18" charset="0"/>
-                                </a:rPr>
-                                <m:t>𝑧</m:t>
-                              </m:r>
-                              <m:r>
-                                <a:rPr lang="en-US" i="1">
-                                  <a:latin typeface="Cambria Math" panose="02040503050406030204" pitchFamily="18" charset="0"/>
-                                </a:rPr>
-                                <m:t>,          </m:t>
-                              </m:r>
-                              <m:r>
-                                <a:rPr lang="en-US" i="1">
-                                  <a:latin typeface="Cambria Math" panose="02040503050406030204" pitchFamily="18" charset="0"/>
-                                </a:rPr>
-                                <m:t>𝑧</m:t>
-                              </m:r>
-                              <m:r>
-                                <a:rPr lang="en-US" i="1">
-                                  <a:latin typeface="Cambria Math" panose="02040503050406030204" pitchFamily="18" charset="0"/>
-                                </a:rPr>
-                                <m:t>≥1</m:t>
-                              </m:r>
-                            </m:e>
-                          </m:eqArr>
-                        </m:e>
-                      </m:d>
                     </m:oMath>
                   </m:oMathPara>
                 </a14:m>
@@ -17472,7 +17394,7 @@
             </p:txBody>
           </p:sp>
         </mc:Choice>
-        <mc:Fallback xmlns="">
+        <mc:Fallback>
           <p:sp>
             <p:nvSpPr>
               <p:cNvPr id="16" name="TextBox 15">
@@ -17490,7 +17412,7 @@
             <p:spPr>
               <a:xfrm>
                 <a:off x="7144082" y="2969591"/>
-                <a:ext cx="2937407" cy="710194"/>
+                <a:ext cx="1785297" cy="369332"/>
               </a:xfrm>
               <a:prstGeom prst="rect">
                 <a:avLst/>
@@ -17498,7 +17420,7 @@
               <a:blipFill>
                 <a:blip r:embed="rId6"/>
                 <a:stretch>
-                  <a:fillRect l="-2586" t="-189474" b="-277193"/>
+                  <a:fillRect/>
                 </a:stretch>
               </a:blipFill>
             </p:spPr>
@@ -21731,6 +21653,17 @@
 </file>
 
 <file path=customXml/item1.xml><?xml version="1.0" encoding="utf-8"?>
+<p:properties xmlns:p="http://schemas.microsoft.com/office/2006/metadata/properties" xmlns:xsi="http://www.w3.org/2001/XMLSchema-instance" xmlns:pc="http://schemas.microsoft.com/office/infopath/2007/PartnerControls">
+  <documentManagement>
+    <TaxCatchAll xmlns="b6c9d19c-b34a-4cf4-8ebf-64c63fc48083" xsi:nil="true"/>
+    <lcf76f155ced4ddcb4097134ff3c332f xmlns="33f92c16-e346-46b5-ac57-2b519ac4cf68">
+      <Terms xmlns="http://schemas.microsoft.com/office/infopath/2007/PartnerControls"/>
+    </lcf76f155ced4ddcb4097134ff3c332f>
+  </documentManagement>
+</p:properties>
+</file>
+
+<file path=customXml/item2.xml><?xml version="1.0" encoding="utf-8"?>
 <ct:contentTypeSchema xmlns:ct="http://schemas.microsoft.com/office/2006/metadata/contentType" xmlns:ma="http://schemas.microsoft.com/office/2006/metadata/properties/metaAttributes" ct:_="" ma:_="" ma:contentTypeName="Document" ma:contentTypeID="0x0101007069032936BB004A979B3FCE77DE1EB1" ma:contentTypeVersion="16" ma:contentTypeDescription="Create a new document." ma:contentTypeScope="" ma:versionID="59b39aa881a230c9f06045ed60478b88">
   <xsd:schema xmlns:xsd="http://www.w3.org/2001/XMLSchema" xmlns:xs="http://www.w3.org/2001/XMLSchema" xmlns:p="http://schemas.microsoft.com/office/2006/metadata/properties" xmlns:ns2="33f92c16-e346-46b5-ac57-2b519ac4cf68" xmlns:ns3="0efde304-9646-43d8-8eee-5b1a55ab17f1" xmlns:ns4="b6c9d19c-b34a-4cf4-8ebf-64c63fc48083" targetNamespace="http://schemas.microsoft.com/office/2006/metadata/properties" ma:root="true" ma:fieldsID="c596c03b60b8e16cee14ab235af6374a" ns2:_="" ns3:_="" ns4:_="">
     <xsd:import namespace="33f92c16-e346-46b5-ac57-2b519ac4cf68"/>
@@ -21970,17 +21903,6 @@
 </ct:contentTypeSchema>
 </file>
 
-<file path=customXml/item2.xml><?xml version="1.0" encoding="utf-8"?>
-<p:properties xmlns:p="http://schemas.microsoft.com/office/2006/metadata/properties" xmlns:xsi="http://www.w3.org/2001/XMLSchema-instance" xmlns:pc="http://schemas.microsoft.com/office/infopath/2007/PartnerControls">
-  <documentManagement>
-    <TaxCatchAll xmlns="b6c9d19c-b34a-4cf4-8ebf-64c63fc48083" xsi:nil="true"/>
-    <lcf76f155ced4ddcb4097134ff3c332f xmlns="33f92c16-e346-46b5-ac57-2b519ac4cf68">
-      <Terms xmlns="http://schemas.microsoft.com/office/infopath/2007/PartnerControls"/>
-    </lcf76f155ced4ddcb4097134ff3c332f>
-  </documentManagement>
-</p:properties>
-</file>
-
 <file path=customXml/item3.xml><?xml version="1.0" encoding="utf-8"?>
 <?mso-contentType ?>
 <FormTemplates xmlns="http://schemas.microsoft.com/sharepoint/v3/contenttype/forms">
@@ -21991,6 +21913,24 @@
 </file>
 
 <file path=customXml/itemProps1.xml><?xml version="1.0" encoding="utf-8"?>
+<ds:datastoreItem xmlns:ds="http://schemas.openxmlformats.org/officeDocument/2006/customXml" ds:itemID="{E709C047-1DE0-4980-A90A-4D5EFC165D2C}">
+  <ds:schemaRefs>
+    <ds:schemaRef ds:uri="0efde304-9646-43d8-8eee-5b1a55ab17f1"/>
+    <ds:schemaRef ds:uri="33f92c16-e346-46b5-ac57-2b519ac4cf68"/>
+    <ds:schemaRef ds:uri="b6c9d19c-b34a-4cf4-8ebf-64c63fc48083"/>
+    <ds:schemaRef ds:uri="http://purl.org/dc/dcmitype/"/>
+    <ds:schemaRef ds:uri="http://purl.org/dc/elements/1.1/"/>
+    <ds:schemaRef ds:uri="http://purl.org/dc/terms/"/>
+    <ds:schemaRef ds:uri="http://schemas.microsoft.com/office/2006/documentManagement/types"/>
+    <ds:schemaRef ds:uri="http://schemas.microsoft.com/office/2006/metadata/properties"/>
+    <ds:schemaRef ds:uri="http://schemas.microsoft.com/office/infopath/2007/PartnerControls"/>
+    <ds:schemaRef ds:uri="http://schemas.openxmlformats.org/package/2006/metadata/core-properties"/>
+    <ds:schemaRef ds:uri="http://www.w3.org/XML/1998/namespace"/>
+  </ds:schemaRefs>
+</ds:datastoreItem>
+</file>
+
+<file path=customXml/itemProps2.xml><?xml version="1.0" encoding="utf-8"?>
 <ds:datastoreItem xmlns:ds="http://schemas.openxmlformats.org/officeDocument/2006/customXml" ds:itemID="{2D7DA705-6300-4113-B183-485198D9C84E}">
   <ds:schemaRefs>
     <ds:schemaRef ds:uri="0efde304-9646-43d8-8eee-5b1a55ab17f1"/>
@@ -22010,24 +21950,6 @@
 </ds:datastoreItem>
 </file>
 
-<file path=customXml/itemProps2.xml><?xml version="1.0" encoding="utf-8"?>
-<ds:datastoreItem xmlns:ds="http://schemas.openxmlformats.org/officeDocument/2006/customXml" ds:itemID="{E709C047-1DE0-4980-A90A-4D5EFC165D2C}">
-  <ds:schemaRefs>
-    <ds:schemaRef ds:uri="0efde304-9646-43d8-8eee-5b1a55ab17f1"/>
-    <ds:schemaRef ds:uri="33f92c16-e346-46b5-ac57-2b519ac4cf68"/>
-    <ds:schemaRef ds:uri="b6c9d19c-b34a-4cf4-8ebf-64c63fc48083"/>
-    <ds:schemaRef ds:uri="http://purl.org/dc/dcmitype/"/>
-    <ds:schemaRef ds:uri="http://purl.org/dc/elements/1.1/"/>
-    <ds:schemaRef ds:uri="http://purl.org/dc/terms/"/>
-    <ds:schemaRef ds:uri="http://schemas.microsoft.com/office/2006/documentManagement/types"/>
-    <ds:schemaRef ds:uri="http://schemas.microsoft.com/office/2006/metadata/properties"/>
-    <ds:schemaRef ds:uri="http://schemas.microsoft.com/office/infopath/2007/PartnerControls"/>
-    <ds:schemaRef ds:uri="http://schemas.openxmlformats.org/package/2006/metadata/core-properties"/>
-    <ds:schemaRef ds:uri="http://www.w3.org/XML/1998/namespace"/>
-  </ds:schemaRefs>
-</ds:datastoreItem>
-</file>
-
 <file path=customXml/itemProps3.xml><?xml version="1.0" encoding="utf-8"?>
 <ds:datastoreItem xmlns:ds="http://schemas.openxmlformats.org/officeDocument/2006/customXml" ds:itemID="{EF0BFC65-ABD5-40EA-BAE0-821B9D6524E8}">
   <ds:schemaRefs>

</xml_diff>